<commit_message>
new portfolio added inkwell but no content
</commit_message>
<xml_diff>
--- a/doc/thumb_maker.pptx
+++ b/doc/thumb_maker.pptx
@@ -104,6 +104,11 @@
       </a:defRPr>
     </a:lvl9pPr>
   </p:defaultTextStyle>
+  <p:extLst>
+    <p:ext uri="{EFAFB233-063F-42B5-8137-9DF3F51BA10A}">
+      <p15:sldGuideLst xmlns:p15="http://schemas.microsoft.com/office/powerpoint/2012/main"/>
+    </p:ext>
+  </p:extLst>
 </p:presentation>
 </file>
 
@@ -258,7 +263,7 @@
           <a:p>
             <a:fld id="{1434D9DF-9068-4D96-AD30-79A95215FB5B}" type="datetimeFigureOut">
               <a:rPr lang="en-US" smtClean="0"/>
-              <a:t>3/6/2018</a:t>
+              <a:t>6/10/2018</a:t>
             </a:fld>
             <a:endParaRPr lang="en-US"/>
           </a:p>
@@ -456,7 +461,7 @@
           <a:p>
             <a:fld id="{1434D9DF-9068-4D96-AD30-79A95215FB5B}" type="datetimeFigureOut">
               <a:rPr lang="en-US" smtClean="0"/>
-              <a:t>3/6/2018</a:t>
+              <a:t>6/10/2018</a:t>
             </a:fld>
             <a:endParaRPr lang="en-US"/>
           </a:p>
@@ -664,7 +669,7 @@
           <a:p>
             <a:fld id="{1434D9DF-9068-4D96-AD30-79A95215FB5B}" type="datetimeFigureOut">
               <a:rPr lang="en-US" smtClean="0"/>
-              <a:t>3/6/2018</a:t>
+              <a:t>6/10/2018</a:t>
             </a:fld>
             <a:endParaRPr lang="en-US"/>
           </a:p>
@@ -862,7 +867,7 @@
           <a:p>
             <a:fld id="{1434D9DF-9068-4D96-AD30-79A95215FB5B}" type="datetimeFigureOut">
               <a:rPr lang="en-US" smtClean="0"/>
-              <a:t>3/6/2018</a:t>
+              <a:t>6/10/2018</a:t>
             </a:fld>
             <a:endParaRPr lang="en-US"/>
           </a:p>
@@ -1137,7 +1142,7 @@
           <a:p>
             <a:fld id="{1434D9DF-9068-4D96-AD30-79A95215FB5B}" type="datetimeFigureOut">
               <a:rPr lang="en-US" smtClean="0"/>
-              <a:t>3/6/2018</a:t>
+              <a:t>6/10/2018</a:t>
             </a:fld>
             <a:endParaRPr lang="en-US"/>
           </a:p>
@@ -1402,7 +1407,7 @@
           <a:p>
             <a:fld id="{1434D9DF-9068-4D96-AD30-79A95215FB5B}" type="datetimeFigureOut">
               <a:rPr lang="en-US" smtClean="0"/>
-              <a:t>3/6/2018</a:t>
+              <a:t>6/10/2018</a:t>
             </a:fld>
             <a:endParaRPr lang="en-US"/>
           </a:p>
@@ -1814,7 +1819,7 @@
           <a:p>
             <a:fld id="{1434D9DF-9068-4D96-AD30-79A95215FB5B}" type="datetimeFigureOut">
               <a:rPr lang="en-US" smtClean="0"/>
-              <a:t>3/6/2018</a:t>
+              <a:t>6/10/2018</a:t>
             </a:fld>
             <a:endParaRPr lang="en-US"/>
           </a:p>
@@ -1955,7 +1960,7 @@
           <a:p>
             <a:fld id="{1434D9DF-9068-4D96-AD30-79A95215FB5B}" type="datetimeFigureOut">
               <a:rPr lang="en-US" smtClean="0"/>
-              <a:t>3/6/2018</a:t>
+              <a:t>6/10/2018</a:t>
             </a:fld>
             <a:endParaRPr lang="en-US"/>
           </a:p>
@@ -2068,7 +2073,7 @@
           <a:p>
             <a:fld id="{1434D9DF-9068-4D96-AD30-79A95215FB5B}" type="datetimeFigureOut">
               <a:rPr lang="en-US" smtClean="0"/>
-              <a:t>3/6/2018</a:t>
+              <a:t>6/10/2018</a:t>
             </a:fld>
             <a:endParaRPr lang="en-US"/>
           </a:p>
@@ -2379,7 +2384,7 @@
           <a:p>
             <a:fld id="{1434D9DF-9068-4D96-AD30-79A95215FB5B}" type="datetimeFigureOut">
               <a:rPr lang="en-US" smtClean="0"/>
-              <a:t>3/6/2018</a:t>
+              <a:t>6/10/2018</a:t>
             </a:fld>
             <a:endParaRPr lang="en-US"/>
           </a:p>
@@ -2667,7 +2672,7 @@
           <a:p>
             <a:fld id="{1434D9DF-9068-4D96-AD30-79A95215FB5B}" type="datetimeFigureOut">
               <a:rPr lang="en-US" smtClean="0"/>
-              <a:t>3/6/2018</a:t>
+              <a:t>6/10/2018</a:t>
             </a:fld>
             <a:endParaRPr lang="en-US"/>
           </a:p>
@@ -2908,7 +2913,7 @@
           <a:p>
             <a:fld id="{1434D9DF-9068-4D96-AD30-79A95215FB5B}" type="datetimeFigureOut">
               <a:rPr lang="en-US" smtClean="0"/>
-              <a:t>3/6/2018</a:t>
+              <a:t>6/10/2018</a:t>
             </a:fld>
             <a:endParaRPr lang="en-US"/>
           </a:p>
@@ -3325,82 +3330,121 @@
           <a:chExt cx="0" cy="0"/>
         </a:xfrm>
       </p:grpSpPr>
-      <p:pic>
-        <p:nvPicPr>
-          <p:cNvPr id="9" name="Picture 8">
-            <a:extLst>
-              <a:ext uri="{FF2B5EF4-FFF2-40B4-BE49-F238E27FC236}">
-                <a16:creationId xmlns:a16="http://schemas.microsoft.com/office/drawing/2014/main" id="{44C5DE39-1FED-463F-BEFF-F9A3814D6E02}"/>
-              </a:ext>
-            </a:extLst>
-          </p:cNvPr>
-          <p:cNvPicPr>
-            <a:picLocks noChangeAspect="1"/>
-          </p:cNvPicPr>
+      <p:grpSp>
+        <p:nvGrpSpPr>
+          <p:cNvPr id="5" name="Group 4">
+            <a:extLst>
+              <a:ext uri="{FF2B5EF4-FFF2-40B4-BE49-F238E27FC236}">
+                <a16:creationId xmlns:a16="http://schemas.microsoft.com/office/drawing/2014/main" id="{755AED37-FB58-4074-B737-F95CB1EAABEF}"/>
+              </a:ext>
+            </a:extLst>
+          </p:cNvPr>
+          <p:cNvGrpSpPr>
+            <a:grpSpLocks/>
+          </p:cNvGrpSpPr>
           <p:nvPr/>
-        </p:nvPicPr>
-        <p:blipFill>
-          <a:blip r:embed="rId2">
-            <a:extLst>
-              <a:ext uri="{28A0092B-C50C-407E-A947-70E740481C1C}">
-                <a14:useLocalDpi xmlns:a14="http://schemas.microsoft.com/office/drawing/2010/main" val="0"/>
-              </a:ext>
-            </a:extLst>
-          </a:blip>
-          <a:stretch>
-            <a:fillRect/>
-          </a:stretch>
-        </p:blipFill>
-        <p:spPr>
+        </p:nvGrpSpPr>
+        <p:grpSpPr>
           <a:xfrm>
-            <a:off x="3791812" y="2178369"/>
-            <a:ext cx="4129169" cy="2223399"/>
+            <a:off x="3791814" y="2178370"/>
+            <a:ext cx="4129169" cy="2223397"/>
+            <a:chOff x="3789919" y="2178369"/>
+            <a:chExt cx="4217745" cy="2223397"/>
           </a:xfrm>
-          <a:prstGeom prst="rect">
-            <a:avLst/>
-          </a:prstGeom>
-        </p:spPr>
-      </p:pic>
-      <p:sp>
-        <p:nvSpPr>
-          <p:cNvPr id="10" name="TextBox 9">
-            <a:extLst>
-              <a:ext uri="{FF2B5EF4-FFF2-40B4-BE49-F238E27FC236}">
-                <a16:creationId xmlns:a16="http://schemas.microsoft.com/office/drawing/2014/main" id="{9DFACBC3-78BA-4570-BFE1-F7D838CA94DA}"/>
-              </a:ext>
-            </a:extLst>
-          </p:cNvPr>
-          <p:cNvSpPr txBox="1"/>
-          <p:nvPr/>
-        </p:nvSpPr>
-        <p:spPr>
-          <a:xfrm>
-            <a:off x="3791811" y="2997682"/>
-            <a:ext cx="4129170" cy="584775"/>
-          </a:xfrm>
-          <a:prstGeom prst="rect">
-            <a:avLst/>
-          </a:prstGeom>
-          <a:noFill/>
-        </p:spPr>
-        <p:txBody>
-          <a:bodyPr wrap="square" rtlCol="0">
-            <a:spAutoFit/>
-          </a:bodyPr>
-          <a:lstStyle/>
-          <a:p>
-            <a:pPr algn="ctr"/>
-            <a:r>
-              <a:rPr lang="en-US" sz="3200" b="1" dirty="0">
-                <a:solidFill>
-                  <a:srgbClr val="FF5F42"/>
-                </a:solidFill>
-              </a:rPr>
-              <a:t>SOUNDCLOUD</a:t>
-            </a:r>
-          </a:p>
-        </p:txBody>
-      </p:sp>
+        </p:grpSpPr>
+        <p:pic>
+          <p:nvPicPr>
+            <p:cNvPr id="9" name="Picture 8">
+              <a:extLst>
+                <a:ext uri="{FF2B5EF4-FFF2-40B4-BE49-F238E27FC236}">
+                  <a16:creationId xmlns:a16="http://schemas.microsoft.com/office/drawing/2014/main" id="{44C5DE39-1FED-463F-BEFF-F9A3814D6E02}"/>
+                </a:ext>
+              </a:extLst>
+            </p:cNvPr>
+            <p:cNvPicPr>
+              <a:picLocks noChangeAspect="1"/>
+            </p:cNvPicPr>
+            <p:nvPr/>
+          </p:nvPicPr>
+          <p:blipFill>
+            <a:blip r:embed="rId2">
+              <a:extLst>
+                <a:ext uri="{BEBA8EAE-BF5A-486C-A8C5-ECC9F3942E4B}">
+                  <a14:imgProps xmlns:a14="http://schemas.microsoft.com/office/drawing/2010/main">
+                    <a14:imgLayer r:embed="rId3">
+                      <a14:imgEffect>
+                        <a14:artisticBlur/>
+                      </a14:imgEffect>
+                    </a14:imgLayer>
+                  </a14:imgProps>
+                </a:ext>
+                <a:ext uri="{28A0092B-C50C-407E-A947-70E740481C1C}">
+                  <a14:useLocalDpi xmlns:a14="http://schemas.microsoft.com/office/drawing/2010/main" val="0"/>
+                </a:ext>
+              </a:extLst>
+            </a:blip>
+            <a:stretch>
+              <a:fillRect/>
+            </a:stretch>
+          </p:blipFill>
+          <p:spPr>
+            <a:xfrm>
+              <a:off x="3789919" y="2178369"/>
+              <a:ext cx="4217745" cy="2223397"/>
+            </a:xfrm>
+            <a:prstGeom prst="rect">
+              <a:avLst/>
+            </a:prstGeom>
+            <a:effectLst>
+              <a:outerShdw dist="50800" dir="5400000" algn="ctr" rotWithShape="0">
+                <a:srgbClr val="000000">
+                  <a:alpha val="43137"/>
+                </a:srgbClr>
+              </a:outerShdw>
+            </a:effectLst>
+          </p:spPr>
+        </p:pic>
+        <p:sp>
+          <p:nvSpPr>
+            <p:cNvPr id="10" name="TextBox 9">
+              <a:extLst>
+                <a:ext uri="{FF2B5EF4-FFF2-40B4-BE49-F238E27FC236}">
+                  <a16:creationId xmlns:a16="http://schemas.microsoft.com/office/drawing/2014/main" id="{9DFACBC3-78BA-4570-BFE1-F7D838CA94DA}"/>
+                </a:ext>
+              </a:extLst>
+            </p:cNvPr>
+            <p:cNvSpPr txBox="1"/>
+            <p:nvPr/>
+          </p:nvSpPr>
+          <p:spPr>
+            <a:xfrm>
+              <a:off x="3883826" y="2997682"/>
+              <a:ext cx="4033716" cy="707886"/>
+            </a:xfrm>
+            <a:prstGeom prst="rect">
+              <a:avLst/>
+            </a:prstGeom>
+            <a:noFill/>
+          </p:spPr>
+          <p:txBody>
+            <a:bodyPr wrap="square" rtlCol="0">
+              <a:spAutoFit/>
+            </a:bodyPr>
+            <a:lstStyle/>
+            <a:p>
+              <a:pPr algn="ctr"/>
+              <a:r>
+                <a:rPr lang="en-US" sz="4000" b="1" dirty="0">
+                  <a:solidFill>
+                    <a:srgbClr val="FF5F42"/>
+                  </a:solidFill>
+                </a:rPr>
+                <a:t>Shooter Hero</a:t>
+              </a:r>
+            </a:p>
+          </p:txBody>
+        </p:sp>
+      </p:grpSp>
     </p:spTree>
     <p:extLst>
       <p:ext uri="{BB962C8B-B14F-4D97-AF65-F5344CB8AC3E}">

</xml_diff>